<commit_message>
agregado lineas a powerpoint
</commit_message>
<xml_diff>
--- a/alumnos.pptx
+++ b/alumnos.pptx
@@ -6,6 +6,7 @@
   </p:sldMasterIdLst>
   <p:sldIdLst>
     <p:sldId id="256" r:id="rId2"/>
+    <p:sldId id="257" r:id="rId3"/>
   </p:sldIdLst>
   <p:sldSz cx="12192000" cy="6858000"/>
   <p:notesSz cx="6858000" cy="9144000"/>
@@ -104,6 +105,11 @@
       </a:defRPr>
     </a:lvl9pPr>
   </p:defaultTextStyle>
+  <p:extLst>
+    <p:ext uri="{EFAFB233-063F-42B5-8137-9DF3F51BA10A}">
+      <p15:sldGuideLst xmlns:p15="http://schemas.microsoft.com/office/powerpoint/2012/main"/>
+    </p:ext>
+  </p:extLst>
 </p:presentation>
 </file>
 
@@ -149,7 +155,7 @@
           </a:lstStyle>
           <a:p>
             <a:r>
-              <a:rPr lang="es-ES" smtClean="0"/>
+              <a:rPr lang="es-ES"/>
               <a:t>Haga clic para modificar el estilo de título del patrón</a:t>
             </a:r>
             <a:endParaRPr lang="en-US" dirty="0"/>
@@ -269,7 +275,7 @@
           </a:lstStyle>
           <a:p>
             <a:r>
-              <a:rPr lang="es-ES" smtClean="0"/>
+              <a:rPr lang="es-ES"/>
               <a:t>Haga clic para editar el estilo de subtítulo del patrón</a:t>
             </a:r>
             <a:endParaRPr lang="en-US" dirty="0"/>
@@ -393,7 +399,7 @@
           </a:lstStyle>
           <a:p>
             <a:r>
-              <a:rPr lang="es-ES" smtClean="0"/>
+              <a:rPr lang="es-ES"/>
               <a:t>Haga clic para modificar el estilo de título del patrón</a:t>
             </a:r>
             <a:endParaRPr lang="en-US" dirty="0"/>
@@ -472,7 +478,7 @@
           </a:lstStyle>
           <a:p>
             <a:r>
-              <a:rPr lang="es-ES" smtClean="0"/>
+              <a:rPr lang="es-ES"/>
               <a:t>Haga clic en el icono para agregar una imagen</a:t>
             </a:r>
             <a:endParaRPr lang="en-US" dirty="0"/>
@@ -540,7 +546,7 @@
           <a:p>
             <a:pPr lvl="0"/>
             <a:r>
-              <a:rPr lang="es-ES" smtClean="0"/>
+              <a:rPr lang="es-ES"/>
               <a:t>Editar el estilo de texto del patrón</a:t>
             </a:r>
           </a:p>
@@ -661,7 +667,7 @@
           </a:lstStyle>
           <a:p>
             <a:r>
-              <a:rPr lang="es-ES" smtClean="0"/>
+              <a:rPr lang="es-ES"/>
               <a:t>Haga clic para modificar el estilo de título del patrón</a:t>
             </a:r>
             <a:endParaRPr lang="en-US" dirty="0"/>
@@ -729,7 +735,7 @@
           <a:p>
             <a:pPr lvl="0"/>
             <a:r>
-              <a:rPr lang="es-ES" smtClean="0"/>
+              <a:rPr lang="es-ES"/>
               <a:t>Editar el estilo de texto del patrón</a:t>
             </a:r>
           </a:p>
@@ -850,7 +856,7 @@
           </a:lstStyle>
           <a:p>
             <a:r>
-              <a:rPr lang="es-ES" smtClean="0"/>
+              <a:rPr lang="es-ES"/>
               <a:t>Haga clic para modificar el estilo de título del patrón</a:t>
             </a:r>
             <a:endParaRPr lang="en-US" dirty="0"/>
@@ -930,7 +936,7 @@
               <a:buNone/>
             </a:pPr>
             <a:r>
-              <a:rPr lang="es-ES" smtClean="0"/>
+              <a:rPr lang="es-ES"/>
               <a:t>Editar el estilo de texto del patrón</a:t>
             </a:r>
           </a:p>
@@ -997,7 +1003,7 @@
           <a:p>
             <a:pPr lvl="0"/>
             <a:r>
-              <a:rPr lang="es-ES" smtClean="0"/>
+              <a:rPr lang="es-ES"/>
               <a:t>Editar el estilo de texto del patrón</a:t>
             </a:r>
           </a:p>
@@ -1212,7 +1218,7 @@
           </a:lstStyle>
           <a:p>
             <a:r>
-              <a:rPr lang="es-ES" smtClean="0"/>
+              <a:rPr lang="es-ES"/>
               <a:t>Haga clic para modificar el estilo de título del patrón</a:t>
             </a:r>
             <a:endParaRPr lang="en-US" dirty="0"/>
@@ -1333,7 +1339,7 @@
           <a:p>
             <a:pPr lvl="0"/>
             <a:r>
-              <a:rPr lang="es-ES" smtClean="0"/>
+              <a:rPr lang="es-ES"/>
               <a:t>Editar el estilo de texto del patrón</a:t>
             </a:r>
           </a:p>
@@ -1449,7 +1455,7 @@
           </a:lstStyle>
           <a:p>
             <a:r>
-              <a:rPr lang="es-ES" smtClean="0"/>
+              <a:rPr lang="es-ES"/>
               <a:t>Haga clic para modificar el estilo de título del patrón</a:t>
             </a:r>
             <a:endParaRPr lang="en-US" dirty="0"/>
@@ -1524,7 +1530,7 @@
           <a:p>
             <a:pPr lvl="0"/>
             <a:r>
-              <a:rPr lang="es-ES" smtClean="0"/>
+              <a:rPr lang="es-ES"/>
               <a:t>Editar el estilo de texto del patrón</a:t>
             </a:r>
           </a:p>
@@ -1591,7 +1597,7 @@
           <a:p>
             <a:pPr lvl="0"/>
             <a:r>
-              <a:rPr lang="es-ES" smtClean="0"/>
+              <a:rPr lang="es-ES"/>
               <a:t>Editar el estilo de texto del patrón</a:t>
             </a:r>
           </a:p>
@@ -1665,7 +1671,7 @@
           <a:p>
             <a:pPr lvl="0"/>
             <a:r>
-              <a:rPr lang="es-ES" smtClean="0"/>
+              <a:rPr lang="es-ES"/>
               <a:t>Editar el estilo de texto del patrón</a:t>
             </a:r>
           </a:p>
@@ -1732,7 +1738,7 @@
           <a:p>
             <a:pPr lvl="0"/>
             <a:r>
-              <a:rPr lang="es-ES" smtClean="0"/>
+              <a:rPr lang="es-ES"/>
               <a:t>Editar el estilo de texto del patrón</a:t>
             </a:r>
           </a:p>
@@ -1806,7 +1812,7 @@
           <a:p>
             <a:pPr lvl="0"/>
             <a:r>
-              <a:rPr lang="es-ES" smtClean="0"/>
+              <a:rPr lang="es-ES"/>
               <a:t>Editar el estilo de texto del patrón</a:t>
             </a:r>
           </a:p>
@@ -1873,7 +1879,7 @@
           <a:p>
             <a:pPr lvl="0"/>
             <a:r>
-              <a:rPr lang="es-ES" smtClean="0"/>
+              <a:rPr lang="es-ES"/>
               <a:t>Editar el estilo de texto del patrón</a:t>
             </a:r>
           </a:p>
@@ -2067,7 +2073,7 @@
           </a:lstStyle>
           <a:p>
             <a:r>
-              <a:rPr lang="es-ES" smtClean="0"/>
+              <a:rPr lang="es-ES"/>
               <a:t>Haga clic para modificar el estilo de título del patrón</a:t>
             </a:r>
             <a:endParaRPr lang="en-US" dirty="0"/>
@@ -2142,7 +2148,7 @@
           <a:p>
             <a:pPr lvl="0"/>
             <a:r>
-              <a:rPr lang="es-ES" smtClean="0"/>
+              <a:rPr lang="es-ES"/>
               <a:t>Editar el estilo de texto del patrón</a:t>
             </a:r>
           </a:p>
@@ -2220,7 +2226,7 @@
           </a:lstStyle>
           <a:p>
             <a:r>
-              <a:rPr lang="es-ES" smtClean="0"/>
+              <a:rPr lang="es-ES"/>
               <a:t>Haga clic en el icono para agregar una imagen</a:t>
             </a:r>
             <a:endParaRPr lang="en-US" dirty="0"/>
@@ -2288,7 +2294,7 @@
           <a:p>
             <a:pPr lvl="0"/>
             <a:r>
-              <a:rPr lang="es-ES" smtClean="0"/>
+              <a:rPr lang="es-ES"/>
               <a:t>Editar el estilo de texto del patrón</a:t>
             </a:r>
           </a:p>
@@ -2362,7 +2368,7 @@
           <a:p>
             <a:pPr lvl="0"/>
             <a:r>
-              <a:rPr lang="es-ES" smtClean="0"/>
+              <a:rPr lang="es-ES"/>
               <a:t>Editar el estilo de texto del patrón</a:t>
             </a:r>
           </a:p>
@@ -2440,7 +2446,7 @@
           </a:lstStyle>
           <a:p>
             <a:r>
-              <a:rPr lang="es-ES" smtClean="0"/>
+              <a:rPr lang="es-ES"/>
               <a:t>Haga clic en el icono para agregar una imagen</a:t>
             </a:r>
             <a:endParaRPr lang="en-US" dirty="0"/>
@@ -2508,7 +2514,7 @@
           <a:p>
             <a:pPr lvl="0"/>
             <a:r>
-              <a:rPr lang="es-ES" smtClean="0"/>
+              <a:rPr lang="es-ES"/>
               <a:t>Editar el estilo de texto del patrón</a:t>
             </a:r>
           </a:p>
@@ -2582,7 +2588,7 @@
           <a:p>
             <a:pPr lvl="0"/>
             <a:r>
-              <a:rPr lang="es-ES" smtClean="0"/>
+              <a:rPr lang="es-ES"/>
               <a:t>Editar el estilo de texto del patrón</a:t>
             </a:r>
           </a:p>
@@ -2660,7 +2666,7 @@
           </a:lstStyle>
           <a:p>
             <a:r>
-              <a:rPr lang="es-ES" smtClean="0"/>
+              <a:rPr lang="es-ES"/>
               <a:t>Haga clic en el icono para agregar una imagen</a:t>
             </a:r>
             <a:endParaRPr lang="en-US" dirty="0"/>
@@ -2728,7 +2734,7 @@
           <a:p>
             <a:pPr lvl="0"/>
             <a:r>
-              <a:rPr lang="es-ES" smtClean="0"/>
+              <a:rPr lang="es-ES"/>
               <a:t>Editar el estilo de texto del patrón</a:t>
             </a:r>
           </a:p>
@@ -2918,7 +2924,7 @@
           <a:lstStyle/>
           <a:p>
             <a:r>
-              <a:rPr lang="es-ES" smtClean="0"/>
+              <a:rPr lang="es-ES"/>
               <a:t>Haga clic para modificar el estilo de título del patrón</a:t>
             </a:r>
             <a:endParaRPr lang="en-US" dirty="0"/>
@@ -2942,35 +2948,35 @@
           <a:p>
             <a:pPr lvl="0"/>
             <a:r>
-              <a:rPr lang="es-ES" smtClean="0"/>
+              <a:rPr lang="es-ES"/>
               <a:t>Editar el estilo de texto del patrón</a:t>
             </a:r>
           </a:p>
           <a:p>
             <a:pPr lvl="1"/>
             <a:r>
-              <a:rPr lang="es-ES" smtClean="0"/>
+              <a:rPr lang="es-ES"/>
               <a:t>Segundo nivel</a:t>
             </a:r>
           </a:p>
           <a:p>
             <a:pPr lvl="2"/>
             <a:r>
-              <a:rPr lang="es-ES" smtClean="0"/>
+              <a:rPr lang="es-ES"/>
               <a:t>Tercer nivel</a:t>
             </a:r>
           </a:p>
           <a:p>
             <a:pPr lvl="3"/>
             <a:r>
-              <a:rPr lang="es-ES" smtClean="0"/>
+              <a:rPr lang="es-ES"/>
               <a:t>Cuarto nivel</a:t>
             </a:r>
           </a:p>
           <a:p>
             <a:pPr lvl="4"/>
             <a:r>
-              <a:rPr lang="es-ES" smtClean="0"/>
+              <a:rPr lang="es-ES"/>
               <a:t>Quinto nivel</a:t>
             </a:r>
             <a:endParaRPr lang="en-US" dirty="0"/>
@@ -3088,7 +3094,7 @@
           <a:lstStyle/>
           <a:p>
             <a:r>
-              <a:rPr lang="es-ES" smtClean="0"/>
+              <a:rPr lang="es-ES"/>
               <a:t>Haga clic para modificar el estilo de título del patrón</a:t>
             </a:r>
             <a:endParaRPr lang="en-US" dirty="0"/>
@@ -3117,35 +3123,35 @@
           <a:p>
             <a:pPr lvl="0"/>
             <a:r>
-              <a:rPr lang="es-ES" smtClean="0"/>
+              <a:rPr lang="es-ES"/>
               <a:t>Editar el estilo de texto del patrón</a:t>
             </a:r>
           </a:p>
           <a:p>
             <a:pPr lvl="1"/>
             <a:r>
-              <a:rPr lang="es-ES" smtClean="0"/>
+              <a:rPr lang="es-ES"/>
               <a:t>Segundo nivel</a:t>
             </a:r>
           </a:p>
           <a:p>
             <a:pPr lvl="2"/>
             <a:r>
-              <a:rPr lang="es-ES" smtClean="0"/>
+              <a:rPr lang="es-ES"/>
               <a:t>Tercer nivel</a:t>
             </a:r>
           </a:p>
           <a:p>
             <a:pPr lvl="3"/>
             <a:r>
-              <a:rPr lang="es-ES" smtClean="0"/>
+              <a:rPr lang="es-ES"/>
               <a:t>Cuarto nivel</a:t>
             </a:r>
           </a:p>
           <a:p>
             <a:pPr lvl="4"/>
             <a:r>
-              <a:rPr lang="es-ES" smtClean="0"/>
+              <a:rPr lang="es-ES"/>
               <a:t>Quinto nivel</a:t>
             </a:r>
             <a:endParaRPr lang="en-US" dirty="0"/>
@@ -3258,7 +3264,7 @@
           <a:lstStyle/>
           <a:p>
             <a:r>
-              <a:rPr lang="es-ES" smtClean="0"/>
+              <a:rPr lang="es-ES"/>
               <a:t>Haga clic para modificar el estilo de título del patrón</a:t>
             </a:r>
             <a:endParaRPr lang="en-US" dirty="0"/>
@@ -3282,35 +3288,35 @@
           <a:p>
             <a:pPr lvl="0"/>
             <a:r>
-              <a:rPr lang="es-ES" smtClean="0"/>
+              <a:rPr lang="es-ES"/>
               <a:t>Editar el estilo de texto del patrón</a:t>
             </a:r>
           </a:p>
           <a:p>
             <a:pPr lvl="1"/>
             <a:r>
-              <a:rPr lang="es-ES" smtClean="0"/>
+              <a:rPr lang="es-ES"/>
               <a:t>Segundo nivel</a:t>
             </a:r>
           </a:p>
           <a:p>
             <a:pPr lvl="2"/>
             <a:r>
-              <a:rPr lang="es-ES" smtClean="0"/>
+              <a:rPr lang="es-ES"/>
               <a:t>Tercer nivel</a:t>
             </a:r>
           </a:p>
           <a:p>
             <a:pPr lvl="3"/>
             <a:r>
-              <a:rPr lang="es-ES" smtClean="0"/>
+              <a:rPr lang="es-ES"/>
               <a:t>Cuarto nivel</a:t>
             </a:r>
           </a:p>
           <a:p>
             <a:pPr lvl="4"/>
             <a:r>
-              <a:rPr lang="es-ES" smtClean="0"/>
+              <a:rPr lang="es-ES"/>
               <a:t>Quinto nivel</a:t>
             </a:r>
             <a:endParaRPr lang="en-US" dirty="0"/>
@@ -3432,7 +3438,7 @@
           </a:lstStyle>
           <a:p>
             <a:r>
-              <a:rPr lang="es-ES" smtClean="0"/>
+              <a:rPr lang="es-ES"/>
               <a:t>Haga clic para modificar el estilo de título del patrón</a:t>
             </a:r>
             <a:endParaRPr lang="en-US" dirty="0"/>
@@ -3553,7 +3559,7 @@
           <a:p>
             <a:pPr lvl="0"/>
             <a:r>
-              <a:rPr lang="es-ES" smtClean="0"/>
+              <a:rPr lang="es-ES"/>
               <a:t>Editar el estilo de texto del patrón</a:t>
             </a:r>
           </a:p>
@@ -3665,7 +3671,7 @@
           <a:lstStyle/>
           <a:p>
             <a:r>
-              <a:rPr lang="es-ES" smtClean="0"/>
+              <a:rPr lang="es-ES"/>
               <a:t>Haga clic para modificar el estilo de título del patrón</a:t>
             </a:r>
             <a:endParaRPr lang="en-US" dirty="0"/>
@@ -3724,35 +3730,35 @@
           <a:p>
             <a:pPr lvl="0"/>
             <a:r>
-              <a:rPr lang="es-ES" smtClean="0"/>
+              <a:rPr lang="es-ES"/>
               <a:t>Editar el estilo de texto del patrón</a:t>
             </a:r>
           </a:p>
           <a:p>
             <a:pPr lvl="1"/>
             <a:r>
-              <a:rPr lang="es-ES" smtClean="0"/>
+              <a:rPr lang="es-ES"/>
               <a:t>Segundo nivel</a:t>
             </a:r>
           </a:p>
           <a:p>
             <a:pPr lvl="2"/>
             <a:r>
-              <a:rPr lang="es-ES" smtClean="0"/>
+              <a:rPr lang="es-ES"/>
               <a:t>Tercer nivel</a:t>
             </a:r>
           </a:p>
           <a:p>
             <a:pPr lvl="3"/>
             <a:r>
-              <a:rPr lang="es-ES" smtClean="0"/>
+              <a:rPr lang="es-ES"/>
               <a:t>Cuarto nivel</a:t>
             </a:r>
           </a:p>
           <a:p>
             <a:pPr lvl="4"/>
             <a:r>
-              <a:rPr lang="es-ES" smtClean="0"/>
+              <a:rPr lang="es-ES"/>
               <a:t>Quinto nivel</a:t>
             </a:r>
             <a:endParaRPr lang="en-US" dirty="0"/>
@@ -3811,35 +3817,35 @@
           <a:p>
             <a:pPr lvl="0"/>
             <a:r>
-              <a:rPr lang="es-ES" smtClean="0"/>
+              <a:rPr lang="es-ES"/>
               <a:t>Editar el estilo de texto del patrón</a:t>
             </a:r>
           </a:p>
           <a:p>
             <a:pPr lvl="1"/>
             <a:r>
-              <a:rPr lang="es-ES" smtClean="0"/>
+              <a:rPr lang="es-ES"/>
               <a:t>Segundo nivel</a:t>
             </a:r>
           </a:p>
           <a:p>
             <a:pPr lvl="2"/>
             <a:r>
-              <a:rPr lang="es-ES" smtClean="0"/>
+              <a:rPr lang="es-ES"/>
               <a:t>Tercer nivel</a:t>
             </a:r>
           </a:p>
           <a:p>
             <a:pPr lvl="3"/>
             <a:r>
-              <a:rPr lang="es-ES" smtClean="0"/>
+              <a:rPr lang="es-ES"/>
               <a:t>Cuarto nivel</a:t>
             </a:r>
           </a:p>
           <a:p>
             <a:pPr lvl="4"/>
             <a:r>
-              <a:rPr lang="es-ES" smtClean="0"/>
+              <a:rPr lang="es-ES"/>
               <a:t>Quinto nivel</a:t>
             </a:r>
             <a:endParaRPr lang="en-US" dirty="0"/>
@@ -3956,7 +3962,7 @@
           </a:lstStyle>
           <a:p>
             <a:r>
-              <a:rPr lang="es-ES" smtClean="0"/>
+              <a:rPr lang="es-ES"/>
               <a:t>Haga clic para modificar el estilo de título del patrón</a:t>
             </a:r>
             <a:endParaRPr lang="en-US" dirty="0"/>
@@ -4031,7 +4037,7 @@
           <a:p>
             <a:pPr lvl="0"/>
             <a:r>
-              <a:rPr lang="es-ES" smtClean="0"/>
+              <a:rPr lang="es-ES"/>
               <a:t>Editar el estilo de texto del patrón</a:t>
             </a:r>
           </a:p>
@@ -4089,35 +4095,35 @@
           <a:p>
             <a:pPr lvl="0"/>
             <a:r>
-              <a:rPr lang="es-ES" smtClean="0"/>
+              <a:rPr lang="es-ES"/>
               <a:t>Editar el estilo de texto del patrón</a:t>
             </a:r>
           </a:p>
           <a:p>
             <a:pPr lvl="1"/>
             <a:r>
-              <a:rPr lang="es-ES" smtClean="0"/>
+              <a:rPr lang="es-ES"/>
               <a:t>Segundo nivel</a:t>
             </a:r>
           </a:p>
           <a:p>
             <a:pPr lvl="2"/>
             <a:r>
-              <a:rPr lang="es-ES" smtClean="0"/>
+              <a:rPr lang="es-ES"/>
               <a:t>Tercer nivel</a:t>
             </a:r>
           </a:p>
           <a:p>
             <a:pPr lvl="3"/>
             <a:r>
-              <a:rPr lang="es-ES" smtClean="0"/>
+              <a:rPr lang="es-ES"/>
               <a:t>Cuarto nivel</a:t>
             </a:r>
           </a:p>
           <a:p>
             <a:pPr lvl="4"/>
             <a:r>
-              <a:rPr lang="es-ES" smtClean="0"/>
+              <a:rPr lang="es-ES"/>
               <a:t>Quinto nivel</a:t>
             </a:r>
             <a:endParaRPr lang="en-US" dirty="0"/>
@@ -4192,7 +4198,7 @@
           <a:p>
             <a:pPr lvl="0"/>
             <a:r>
-              <a:rPr lang="es-ES" smtClean="0"/>
+              <a:rPr lang="es-ES"/>
               <a:t>Editar el estilo de texto del patrón</a:t>
             </a:r>
           </a:p>
@@ -4250,35 +4256,35 @@
           <a:p>
             <a:pPr lvl="0"/>
             <a:r>
-              <a:rPr lang="es-ES" smtClean="0"/>
+              <a:rPr lang="es-ES"/>
               <a:t>Editar el estilo de texto del patrón</a:t>
             </a:r>
           </a:p>
           <a:p>
             <a:pPr lvl="1"/>
             <a:r>
-              <a:rPr lang="es-ES" smtClean="0"/>
+              <a:rPr lang="es-ES"/>
               <a:t>Segundo nivel</a:t>
             </a:r>
           </a:p>
           <a:p>
             <a:pPr lvl="2"/>
             <a:r>
-              <a:rPr lang="es-ES" smtClean="0"/>
+              <a:rPr lang="es-ES"/>
               <a:t>Tercer nivel</a:t>
             </a:r>
           </a:p>
           <a:p>
             <a:pPr lvl="3"/>
             <a:r>
-              <a:rPr lang="es-ES" smtClean="0"/>
+              <a:rPr lang="es-ES"/>
               <a:t>Cuarto nivel</a:t>
             </a:r>
           </a:p>
           <a:p>
             <a:pPr lvl="4"/>
             <a:r>
-              <a:rPr lang="es-ES" smtClean="0"/>
+              <a:rPr lang="es-ES"/>
               <a:t>Quinto nivel</a:t>
             </a:r>
             <a:endParaRPr lang="en-US" dirty="0"/>
@@ -4391,7 +4397,7 @@
           <a:lstStyle/>
           <a:p>
             <a:r>
-              <a:rPr lang="es-ES" smtClean="0"/>
+              <a:rPr lang="es-ES"/>
               <a:t>Haga clic para modificar el estilo de título del patrón</a:t>
             </a:r>
             <a:endParaRPr lang="en-US" dirty="0"/>
@@ -4603,7 +4609,7 @@
           </a:lstStyle>
           <a:p>
             <a:r>
-              <a:rPr lang="es-ES" smtClean="0"/>
+              <a:rPr lang="es-ES"/>
               <a:t>Haga clic para modificar el estilo de título del patrón</a:t>
             </a:r>
             <a:endParaRPr lang="en-US" dirty="0"/>
@@ -4662,35 +4668,35 @@
           <a:p>
             <a:pPr lvl="0"/>
             <a:r>
-              <a:rPr lang="es-ES" smtClean="0"/>
+              <a:rPr lang="es-ES"/>
               <a:t>Editar el estilo de texto del patrón</a:t>
             </a:r>
           </a:p>
           <a:p>
             <a:pPr lvl="1"/>
             <a:r>
-              <a:rPr lang="es-ES" smtClean="0"/>
+              <a:rPr lang="es-ES"/>
               <a:t>Segundo nivel</a:t>
             </a:r>
           </a:p>
           <a:p>
             <a:pPr lvl="2"/>
             <a:r>
-              <a:rPr lang="es-ES" smtClean="0"/>
+              <a:rPr lang="es-ES"/>
               <a:t>Tercer nivel</a:t>
             </a:r>
           </a:p>
           <a:p>
             <a:pPr lvl="3"/>
             <a:r>
-              <a:rPr lang="es-ES" smtClean="0"/>
+              <a:rPr lang="es-ES"/>
               <a:t>Cuarto nivel</a:t>
             </a:r>
           </a:p>
           <a:p>
             <a:pPr lvl="4"/>
             <a:r>
-              <a:rPr lang="es-ES" smtClean="0"/>
+              <a:rPr lang="es-ES"/>
               <a:t>Quinto nivel</a:t>
             </a:r>
             <a:endParaRPr lang="en-US" dirty="0"/>
@@ -4756,7 +4762,7 @@
           <a:p>
             <a:pPr lvl="0"/>
             <a:r>
-              <a:rPr lang="es-ES" smtClean="0"/>
+              <a:rPr lang="es-ES"/>
               <a:t>Editar el estilo de texto del patrón</a:t>
             </a:r>
           </a:p>
@@ -4879,7 +4885,7 @@
           </a:lstStyle>
           <a:p>
             <a:r>
-              <a:rPr lang="es-ES" smtClean="0"/>
+              <a:rPr lang="es-ES"/>
               <a:t>Haga clic para modificar el estilo de título del patrón</a:t>
             </a:r>
             <a:endParaRPr lang="en-US" dirty="0"/>
@@ -4958,7 +4964,7 @@
           </a:lstStyle>
           <a:p>
             <a:r>
-              <a:rPr lang="es-ES" smtClean="0"/>
+              <a:rPr lang="es-ES"/>
               <a:t>Haga clic en el icono para agregar una imagen</a:t>
             </a:r>
             <a:endParaRPr lang="en-US" dirty="0"/>
@@ -5026,7 +5032,7 @@
           <a:p>
             <a:pPr lvl="0"/>
             <a:r>
-              <a:rPr lang="es-ES" smtClean="0"/>
+              <a:rPr lang="es-ES"/>
               <a:t>Editar el estilo de texto del patrón</a:t>
             </a:r>
           </a:p>
@@ -5368,7 +5374,7 @@
           <a:lstStyle/>
           <a:p>
             <a:r>
-              <a:rPr lang="es-ES" smtClean="0"/>
+              <a:rPr lang="es-ES"/>
               <a:t>Haga clic para modificar el estilo de título del patrón</a:t>
             </a:r>
             <a:endParaRPr lang="en-US" dirty="0"/>
@@ -5402,35 +5408,35 @@
           <a:p>
             <a:pPr lvl="0"/>
             <a:r>
-              <a:rPr lang="es-ES" smtClean="0"/>
+              <a:rPr lang="es-ES"/>
               <a:t>Editar el estilo de texto del patrón</a:t>
             </a:r>
           </a:p>
           <a:p>
             <a:pPr lvl="1"/>
             <a:r>
-              <a:rPr lang="es-ES" smtClean="0"/>
+              <a:rPr lang="es-ES"/>
               <a:t>Segundo nivel</a:t>
             </a:r>
           </a:p>
           <a:p>
             <a:pPr lvl="2"/>
             <a:r>
-              <a:rPr lang="es-ES" smtClean="0"/>
+              <a:rPr lang="es-ES"/>
               <a:t>Tercer nivel</a:t>
             </a:r>
           </a:p>
           <a:p>
             <a:pPr lvl="3"/>
             <a:r>
-              <a:rPr lang="es-ES" smtClean="0"/>
+              <a:rPr lang="es-ES"/>
               <a:t>Cuarto nivel</a:t>
             </a:r>
           </a:p>
           <a:p>
             <a:pPr lvl="4"/>
             <a:r>
-              <a:rPr lang="es-ES" smtClean="0"/>
+              <a:rPr lang="es-ES"/>
               <a:t>Quinto nivel</a:t>
             </a:r>
             <a:endParaRPr lang="en-US" dirty="0"/>
@@ -6013,10 +6019,9 @@
           <a:lstStyle/>
           <a:p>
             <a:r>
-              <a:rPr lang="es-MX" smtClean="0"/>
+              <a:rPr lang="es-MX"/>
               <a:t>GIT y GITHUB</a:t>
             </a:r>
-            <a:endParaRPr lang="es-MX"/>
           </a:p>
         </p:txBody>
       </p:sp>
@@ -6043,6 +6048,135 @@
     <p:extLst>
       <p:ext uri="{BB962C8B-B14F-4D97-AF65-F5344CB8AC3E}">
         <p14:creationId xmlns:p14="http://schemas.microsoft.com/office/powerpoint/2010/main" val="567984337"/>
+      </p:ext>
+    </p:extLst>
+  </p:cSld>
+  <p:clrMapOvr>
+    <a:masterClrMapping/>
+  </p:clrMapOvr>
+</p:sld>
+</file>
+
+<file path=ppt/slides/slide2.xml><?xml version="1.0" encoding="utf-8"?>
+<p:sld xmlns:a="http://schemas.openxmlformats.org/drawingml/2006/main" xmlns:r="http://schemas.openxmlformats.org/officeDocument/2006/relationships" xmlns:p="http://schemas.openxmlformats.org/presentationml/2006/main">
+  <p:cSld>
+    <p:spTree>
+      <p:nvGrpSpPr>
+        <p:cNvPr id="1" name=""/>
+        <p:cNvGrpSpPr/>
+        <p:nvPr/>
+      </p:nvGrpSpPr>
+      <p:grpSpPr>
+        <a:xfrm>
+          <a:off x="0" y="0"/>
+          <a:ext cx="0" cy="0"/>
+          <a:chOff x="0" y="0"/>
+          <a:chExt cx="0" cy="0"/>
+        </a:xfrm>
+      </p:grpSpPr>
+      <p:sp>
+        <p:nvSpPr>
+          <p:cNvPr id="2" name="Título 1">
+            <a:extLst>
+              <a:ext uri="{FF2B5EF4-FFF2-40B4-BE49-F238E27FC236}">
+                <a16:creationId xmlns:a16="http://schemas.microsoft.com/office/drawing/2014/main" id="{9D2049D1-CEBA-42C4-8A91-0D133D5AA77E}"/>
+              </a:ext>
+            </a:extLst>
+          </p:cNvPr>
+          <p:cNvSpPr>
+            <a:spLocks noGrp="1"/>
+          </p:cNvSpPr>
+          <p:nvPr>
+            <p:ph type="title"/>
+          </p:nvPr>
+        </p:nvSpPr>
+        <p:spPr/>
+        <p:txBody>
+          <a:bodyPr/>
+          <a:lstStyle/>
+          <a:p>
+            <a:endParaRPr lang="es-MX"/>
+          </a:p>
+        </p:txBody>
+      </p:sp>
+      <p:sp>
+        <p:nvSpPr>
+          <p:cNvPr id="3" name="Marcador de contenido 2">
+            <a:extLst>
+              <a:ext uri="{FF2B5EF4-FFF2-40B4-BE49-F238E27FC236}">
+                <a16:creationId xmlns:a16="http://schemas.microsoft.com/office/drawing/2014/main" id="{6D35020A-FAB2-4D8C-B1A1-E22D4DAC1AB2}"/>
+              </a:ext>
+            </a:extLst>
+          </p:cNvPr>
+          <p:cNvSpPr>
+            <a:spLocks noGrp="1"/>
+          </p:cNvSpPr>
+          <p:nvPr>
+            <p:ph idx="1"/>
+          </p:nvPr>
+        </p:nvSpPr>
+        <p:spPr/>
+        <p:txBody>
+          <a:bodyPr/>
+          <a:lstStyle/>
+          <a:p>
+            <a:r>
+              <a:rPr lang="es-MX" dirty="0"/>
+              <a:t>José Luis Alfaro Martínez</a:t>
+            </a:r>
+          </a:p>
+          <a:p>
+            <a:r>
+              <a:rPr lang="es-MX" dirty="0" err="1"/>
+              <a:t>GItJAccount</a:t>
+            </a:r>
+            <a:endParaRPr lang="es-MX" dirty="0"/>
+          </a:p>
+          <a:p>
+            <a:r>
+              <a:rPr lang="es-MX" dirty="0"/>
+              <a:t>8341084665</a:t>
+            </a:r>
+          </a:p>
+          <a:p>
+            <a:endParaRPr lang="es-MX" dirty="0"/>
+          </a:p>
+        </p:txBody>
+      </p:sp>
+      <p:pic>
+        <p:nvPicPr>
+          <p:cNvPr id="5" name="Imagen 4">
+            <a:extLst>
+              <a:ext uri="{FF2B5EF4-FFF2-40B4-BE49-F238E27FC236}">
+                <a16:creationId xmlns:a16="http://schemas.microsoft.com/office/drawing/2014/main" id="{B52DFB0E-BDC8-4AE2-A6E1-49113983CD18}"/>
+              </a:ext>
+            </a:extLst>
+          </p:cNvPr>
+          <p:cNvPicPr>
+            <a:picLocks noChangeAspect="1"/>
+          </p:cNvPicPr>
+          <p:nvPr/>
+        </p:nvPicPr>
+        <p:blipFill>
+          <a:blip r:embed="rId2"/>
+          <a:stretch>
+            <a:fillRect/>
+          </a:stretch>
+        </p:blipFill>
+        <p:spPr>
+          <a:xfrm>
+            <a:off x="5348472" y="2166151"/>
+            <a:ext cx="4956367" cy="3064585"/>
+          </a:xfrm>
+          <a:prstGeom prst="rect">
+            <a:avLst/>
+          </a:prstGeom>
+        </p:spPr>
+      </p:pic>
+    </p:spTree>
+    <p:extLst>
+      <p:ext uri="{BB962C8B-B14F-4D97-AF65-F5344CB8AC3E}">
+        <p14:creationId xmlns:p14="http://schemas.microsoft.com/office/powerpoint/2010/main" val="4243839269"/>
       </p:ext>
     </p:extLst>
   </p:cSld>

</xml_diff>